<commit_message>
Finished LCO brief PPT
</commit_message>
<xml_diff>
--- a/LCO_Brief_Placeholder/Deliverables/lco-briefing.pptx
+++ b/LCO_Brief_Placeholder/Deliverables/lco-briefing.pptx
@@ -13,13 +13,13 @@
     <p:sldId id="257" r:id="rId4"/>
     <p:sldId id="261" r:id="rId5"/>
     <p:sldId id="262" r:id="rId6"/>
-    <p:sldId id="282" r:id="rId7"/>
-    <p:sldId id="281" r:id="rId8"/>
-    <p:sldId id="264" r:id="rId9"/>
-    <p:sldId id="265" r:id="rId10"/>
-    <p:sldId id="266" r:id="rId11"/>
-    <p:sldId id="267" r:id="rId12"/>
-    <p:sldId id="263" r:id="rId13"/>
+    <p:sldId id="263" r:id="rId7"/>
+    <p:sldId id="282" r:id="rId8"/>
+    <p:sldId id="281" r:id="rId9"/>
+    <p:sldId id="264" r:id="rId10"/>
+    <p:sldId id="265" r:id="rId11"/>
+    <p:sldId id="266" r:id="rId12"/>
+    <p:sldId id="267" r:id="rId13"/>
     <p:sldId id="268" r:id="rId14"/>
     <p:sldId id="270" r:id="rId15"/>
     <p:sldId id="278" r:id="rId16"/>
@@ -11089,8 +11089,8 @@
     <dgm:cxn modelId="{E84E829F-2A18-4F87-93C2-C40146B61A23}" type="presOf" srcId="{14D27D49-E5F3-4F3F-984A-B52B24A2DB40}" destId="{3A116811-B1D9-4E82-AD9A-B2A2DCFBC323}" srcOrd="0" destOrd="0" presId="urn:microsoft.com/office/officeart/2005/8/layout/list1"/>
     <dgm:cxn modelId="{A139FB11-8D91-4F75-A30F-CBF42A656369}" type="presOf" srcId="{7383A405-BE4C-4E48-93A6-5B2CF0A4B328}" destId="{BD00AF8C-DE37-45F1-9926-46855B42741D}" srcOrd="0" destOrd="0" presId="urn:microsoft.com/office/officeart/2005/8/layout/list1"/>
     <dgm:cxn modelId="{F3DDFA0B-D021-4826-B135-04B9CF72B635}" type="presOf" srcId="{50EB82D2-2654-4B45-A0D7-AF222CA21AAA}" destId="{3A116811-B1D9-4E82-AD9A-B2A2DCFBC323}" srcOrd="0" destOrd="1" presId="urn:microsoft.com/office/officeart/2005/8/layout/list1"/>
+    <dgm:cxn modelId="{8E84E034-F563-49DB-B284-74B6625F03B7}" type="presOf" srcId="{2589634E-7C13-42BC-84FA-9A195F1BA3C6}" destId="{3A116811-B1D9-4E82-AD9A-B2A2DCFBC323}" srcOrd="0" destOrd="3" presId="urn:microsoft.com/office/officeart/2005/8/layout/list1"/>
     <dgm:cxn modelId="{20658C95-F1E3-463B-B131-52D6E713394A}" srcId="{F2732604-F7C3-4D68-B3B5-1BB13A09D443}" destId="{14D27D49-E5F3-4F3F-984A-B52B24A2DB40}" srcOrd="0" destOrd="0" parTransId="{7F1E842A-3D15-4B67-9685-FE3A7503130D}" sibTransId="{8C3EA81B-DD6A-4439-80E1-FA4BFA6DF165}"/>
-    <dgm:cxn modelId="{8E84E034-F563-49DB-B284-74B6625F03B7}" type="presOf" srcId="{2589634E-7C13-42BC-84FA-9A195F1BA3C6}" destId="{3A116811-B1D9-4E82-AD9A-B2A2DCFBC323}" srcOrd="0" destOrd="3" presId="urn:microsoft.com/office/officeart/2005/8/layout/list1"/>
     <dgm:cxn modelId="{6DF3D97F-AA50-4811-BA2E-8CD4EAB17070}" type="presOf" srcId="{1E61FFB7-0174-43A6-9382-96B23B9D3ADD}" destId="{3A116811-B1D9-4E82-AD9A-B2A2DCFBC323}" srcOrd="0" destOrd="2" presId="urn:microsoft.com/office/officeart/2005/8/layout/list1"/>
     <dgm:cxn modelId="{03D091C4-C9E9-46DA-8692-44BC4AEE3390}" type="presParOf" srcId="{BD00AF8C-DE37-45F1-9926-46855B42741D}" destId="{3F6AE614-4A0E-4C48-84FE-EF34E929A1E2}" srcOrd="0" destOrd="0" presId="urn:microsoft.com/office/officeart/2005/8/layout/list1"/>
     <dgm:cxn modelId="{BEBC0E49-BA2D-4721-B929-0E3109FDAD4E}" type="presParOf" srcId="{3F6AE614-4A0E-4C48-84FE-EF34E929A1E2}" destId="{51939834-C2D2-4E5F-9E62-17F89C09EBE9}" srcOrd="0" destOrd="0" presId="urn:microsoft.com/office/officeart/2005/8/layout/list1"/>
@@ -11616,7 +11616,7 @@
   <dgm:whole/>
   <dgm:extLst>
     <a:ext uri="http://schemas.microsoft.com/office/drawing/2008/diagram">
-      <dsp:dataModelExt xmlns:dsp="http://schemas.microsoft.com/office/drawing/2008/diagram" xmlns="" relId="rId7" minVer="http://schemas.openxmlformats.org/drawingml/2006/diagram"/>
+      <dsp:dataModelExt xmlns:dsp="http://schemas.microsoft.com/office/drawing/2008/diagram" xmlns="" relId="rId8" minVer="http://schemas.openxmlformats.org/drawingml/2006/diagram"/>
     </a:ext>
   </dgm:extLst>
 </dgm:dataModel>
@@ -12429,7 +12429,7 @@
   <dgm:whole/>
   <dgm:extLst>
     <a:ext uri="http://schemas.microsoft.com/office/drawing/2008/diagram">
-      <dsp:dataModelExt xmlns:dsp="http://schemas.microsoft.com/office/drawing/2008/diagram" xmlns="" relId="rId7" minVer="http://schemas.openxmlformats.org/drawingml/2006/diagram"/>
+      <dsp:dataModelExt xmlns:dsp="http://schemas.microsoft.com/office/drawing/2008/diagram" xmlns="" relId="rId8" minVer="http://schemas.openxmlformats.org/drawingml/2006/diagram"/>
     </a:ext>
   </dgm:extLst>
 </dgm:dataModel>
@@ -13781,7 +13781,7 @@
   <dgm:whole/>
   <dgm:extLst>
     <a:ext uri="http://schemas.microsoft.com/office/drawing/2008/diagram">
-      <dsp:dataModelExt xmlns:dsp="http://schemas.microsoft.com/office/drawing/2008/diagram" xmlns="" relId="rId6" minVer="http://schemas.openxmlformats.org/drawingml/2006/diagram"/>
+      <dsp:dataModelExt xmlns:dsp="http://schemas.microsoft.com/office/drawing/2008/diagram" xmlns="" relId="rId7" minVer="http://schemas.openxmlformats.org/drawingml/2006/diagram"/>
     </a:ext>
   </dgm:extLst>
 </dgm:dataModel>
@@ -14397,10 +14397,9 @@
         <a:lstStyle/>
         <a:p>
           <a:r>
-            <a:rPr lang="en-US" altLang="zh-CN" b="1" smtClean="0"/>
+            <a:rPr lang="en-US" altLang="zh-CN" b="1" dirty="0" smtClean="0"/>
             <a:t>Database access response time</a:t>
           </a:r>
-          <a:endParaRPr lang="en-US" altLang="zh-CN" b="1" dirty="0" smtClean="0"/>
         </a:p>
       </dgm:t>
     </dgm:pt>
@@ -14434,10 +14433,17 @@
         <a:lstStyle/>
         <a:p>
           <a:r>
-            <a:rPr lang="en-US" altLang="zh-CN" smtClean="0"/>
-            <a:t>The system shall provide access to the legacy course catalog database with no more than a 10 second latency.</a:t>
+            <a:rPr lang="en-US" altLang="zh-CN" dirty="0" smtClean="0"/>
+            <a:t>The system shall provide access to the legacy </a:t>
           </a:r>
-          <a:endParaRPr lang="en-US" altLang="zh-CN" dirty="0" smtClean="0"/>
+          <a:r>
+            <a:rPr lang="en-US" altLang="zh-CN" dirty="0" smtClean="0"/>
+            <a:t>route </a:t>
+          </a:r>
+          <a:r>
+            <a:rPr lang="en-US" altLang="zh-CN" dirty="0" smtClean="0"/>
+            <a:t>catalog database with no more than a 10 second latency.</a:t>
+          </a:r>
         </a:p>
       </dgm:t>
     </dgm:pt>
@@ -14699,7 +14705,7 @@
   <dgm:whole/>
   <dgm:extLst>
     <a:ext uri="http://schemas.microsoft.com/office/drawing/2008/diagram">
-      <dsp:dataModelExt xmlns:dsp="http://schemas.microsoft.com/office/drawing/2008/diagram" xmlns="" relId="rId6" minVer="http://schemas.openxmlformats.org/drawingml/2006/diagram"/>
+      <dsp:dataModelExt xmlns:dsp="http://schemas.microsoft.com/office/drawing/2008/diagram" xmlns="" relId="rId7" minVer="http://schemas.openxmlformats.org/drawingml/2006/diagram"/>
     </a:ext>
   </dgm:extLst>
 </dgm:dataModel>
@@ -15251,8 +15257,8 @@
     <dgm:cxn modelId="{D2BA6725-F19F-4827-859D-9472CE6BBB8F}" type="presOf" srcId="{FDD5F494-38C4-47C6-9D19-54B7EF83EB7F}" destId="{98AA630D-1984-4009-B657-D0BACFA95942}" srcOrd="0" destOrd="1" presId="urn:microsoft.com/office/officeart/2005/8/layout/list1"/>
     <dgm:cxn modelId="{D97E62C6-8D9A-443A-BFCB-8CEE0E11D846}" type="presOf" srcId="{5192AE29-7FE1-46B9-B4AE-5F53525BC39C}" destId="{3C31FDD6-7F16-434F-B243-AE5D88E32B3E}" srcOrd="0" destOrd="1" presId="urn:microsoft.com/office/officeart/2005/8/layout/list1"/>
     <dgm:cxn modelId="{83B78AC2-C15B-48B5-B3D2-9AB0BD9FE476}" type="presOf" srcId="{00D90CAB-0A3C-4687-A3F0-9EEA2287548E}" destId="{901B3937-9BCF-431A-9EEE-53FCA527231D}" srcOrd="1" destOrd="0" presId="urn:microsoft.com/office/officeart/2005/8/layout/list1"/>
+    <dgm:cxn modelId="{CC28BA38-9AC2-44D2-8408-AACD50047EA2}" srcId="{6ED76C86-54AA-47F4-AF65-FF62D01F400A}" destId="{5192AE29-7FE1-46B9-B4AE-5F53525BC39C}" srcOrd="1" destOrd="0" parTransId="{ED868FB3-D35D-4C81-A94A-2A82A2C5A809}" sibTransId="{6D755FD5-C975-471B-AA90-0EDD25F3CFC5}"/>
     <dgm:cxn modelId="{2415D1E8-1A20-4B12-80A8-780BD1F96BE0}" srcId="{B584FA2E-0FF8-4ABE-A73B-DF5198A9E76D}" destId="{FDD5F494-38C4-47C6-9D19-54B7EF83EB7F}" srcOrd="1" destOrd="0" parTransId="{828613DB-F8FC-4AF5-88F4-F064269CD231}" sibTransId="{AB888C33-C767-4D2B-B785-E4C671C5FF66}"/>
-    <dgm:cxn modelId="{CC28BA38-9AC2-44D2-8408-AACD50047EA2}" srcId="{6ED76C86-54AA-47F4-AF65-FF62D01F400A}" destId="{5192AE29-7FE1-46B9-B4AE-5F53525BC39C}" srcOrd="1" destOrd="0" parTransId="{ED868FB3-D35D-4C81-A94A-2A82A2C5A809}" sibTransId="{6D755FD5-C975-471B-AA90-0EDD25F3CFC5}"/>
     <dgm:cxn modelId="{162BB373-E4C2-41F8-ABEA-EE0809807D86}" type="presOf" srcId="{00D90CAB-0A3C-4687-A3F0-9EEA2287548E}" destId="{D57D8A87-7C2D-4768-9D0D-C915418DA2C8}" srcOrd="0" destOrd="0" presId="urn:microsoft.com/office/officeart/2005/8/layout/list1"/>
     <dgm:cxn modelId="{11ECCFD5-9BF4-4C2D-BEAA-4BD0FFCC10B0}" type="presOf" srcId="{DFFD7BD3-F7E8-4033-88CB-C40C5111C22F}" destId="{3C31FDD6-7F16-434F-B243-AE5D88E32B3E}" srcOrd="0" destOrd="0" presId="urn:microsoft.com/office/officeart/2005/8/layout/list1"/>
     <dgm:cxn modelId="{9C4D885C-0EED-4251-83C3-39EF8AA4D27D}" type="presParOf" srcId="{3C869451-9766-4F5C-B144-00BC10184BA0}" destId="{73F81C09-E695-4FA2-A0E1-06A7330BD841}" srcOrd="0" destOrd="0" presId="urn:microsoft.com/office/officeart/2005/8/layout/list1"/>
@@ -16080,9 +16086,13 @@
         <a:p>
           <a:r>
             <a:rPr lang="en-US" smtClean="0"/>
-            <a:t>Much like the process at the end of each phase, requirements will be assessed at the end and all throughout the iterations until release. If changes in requirements are required mid iteration they will be addressed when needed. </a:t>
+            <a:t>Much like the process at the end of each phase, requirements will be assessed at the end and all throughout the iterations until release. </a:t>
           </a:r>
-          <a:endParaRPr lang="en-US"/>
+          <a:r>
+            <a:rPr lang="en-US" dirty="0" smtClean="0"/>
+            <a:t>If changes in requirements are required mid iteration they will be addressed when needed. </a:t>
+          </a:r>
+          <a:endParaRPr lang="en-US" dirty="0"/>
         </a:p>
       </dgm:t>
     </dgm:pt>
@@ -20388,10 +20398,9 @@
             <a:buChar char="••"/>
           </a:pPr>
           <a:r>
-            <a:rPr lang="en-US" altLang="zh-CN" sz="2000" b="1" kern="1200" smtClean="0"/>
+            <a:rPr lang="en-US" altLang="zh-CN" sz="2000" b="1" kern="1200" dirty="0" smtClean="0"/>
             <a:t>Database access response time</a:t>
           </a:r>
-          <a:endParaRPr lang="en-US" altLang="zh-CN" sz="2000" b="1" kern="1200" dirty="0" smtClean="0"/>
         </a:p>
         <a:p>
           <a:pPr marL="228600" lvl="1" indent="-228600" algn="l" defTabSz="889000">
@@ -20407,10 +20416,17 @@
             <a:buChar char="••"/>
           </a:pPr>
           <a:r>
-            <a:rPr lang="en-US" altLang="zh-CN" sz="2000" kern="1200" smtClean="0"/>
-            <a:t>The system shall provide access to the legacy course catalog database with no more than a 10 second latency.</a:t>
+            <a:rPr lang="en-US" altLang="zh-CN" sz="2000" kern="1200" dirty="0" smtClean="0"/>
+            <a:t>The system shall provide access to the legacy </a:t>
           </a:r>
-          <a:endParaRPr lang="en-US" altLang="zh-CN" sz="2000" kern="1200" dirty="0" smtClean="0"/>
+          <a:r>
+            <a:rPr lang="en-US" altLang="zh-CN" sz="2000" kern="1200" dirty="0" smtClean="0"/>
+            <a:t>route </a:t>
+          </a:r>
+          <a:r>
+            <a:rPr lang="en-US" altLang="zh-CN" sz="2000" kern="1200" dirty="0" smtClean="0"/>
+            <a:t>catalog database with no more than a 10 second latency.</a:t>
+          </a:r>
         </a:p>
         <a:p>
           <a:pPr marL="228600" lvl="1" indent="-228600" algn="l" defTabSz="889000">
@@ -21880,9 +21896,13 @@
           </a:pPr>
           <a:r>
             <a:rPr lang="en-US" sz="2300" kern="1200" smtClean="0"/>
-            <a:t>Much like the process at the end of each phase, requirements will be assessed at the end and all throughout the iterations until release. If changes in requirements are required mid iteration they will be addressed when needed. </a:t>
+            <a:t>Much like the process at the end of each phase, requirements will be assessed at the end and all throughout the iterations until release. </a:t>
           </a:r>
-          <a:endParaRPr lang="en-US" sz="2300" kern="1200"/>
+          <a:r>
+            <a:rPr lang="en-US" sz="2300" kern="1200" dirty="0" smtClean="0"/>
+            <a:t>If changes in requirements are required mid iteration they will be addressed when needed. </a:t>
+          </a:r>
+          <a:endParaRPr lang="en-US" sz="2300" kern="1200" dirty="0"/>
         </a:p>
       </dsp:txBody>
       <dsp:txXfrm>
@@ -40431,6 +40451,252 @@
           <a:bodyPr/>
           <a:lstStyle/>
           <a:p>
+            <a:fld id="{84F354D4-1058-47E6-822B-B270E01C7F3F}" type="slidenum">
+              <a:rPr lang="en-US"/>
+              <a:pPr/>
+              <a:t>16</a:t>
+            </a:fld>
+            <a:endParaRPr lang="en-US"/>
+          </a:p>
+        </p:txBody>
+      </p:sp>
+      <p:sp>
+        <p:nvSpPr>
+          <p:cNvPr id="19457" name="Rectangle 1"/>
+          <p:cNvSpPr txBox="1">
+            <a:spLocks noGrp="1" noRot="1" noChangeAspect="1" noChangeArrowheads="1"/>
+          </p:cNvSpPr>
+          <p:nvPr>
+            <p:ph type="sldImg"/>
+          </p:nvPr>
+        </p:nvSpPr>
+        <p:spPr bwMode="auto">
+          <a:xfrm>
+            <a:off x="1143000" y="693738"/>
+            <a:ext cx="4572000" cy="3429000"/>
+          </a:xfrm>
+          <a:prstGeom prst="rect">
+            <a:avLst/>
+          </a:prstGeom>
+          <a:solidFill>
+            <a:srgbClr val="FFFFFF"/>
+          </a:solidFill>
+          <a:ln>
+            <a:solidFill>
+              <a:srgbClr val="000000"/>
+            </a:solidFill>
+            <a:miter lim="800000"/>
+            <a:headEnd/>
+            <a:tailEnd/>
+          </a:ln>
+        </p:spPr>
+      </p:sp>
+      <p:sp>
+        <p:nvSpPr>
+          <p:cNvPr id="19458" name="Rectangle 2"/>
+          <p:cNvSpPr txBox="1">
+            <a:spLocks noGrp="1" noChangeArrowheads="1"/>
+          </p:cNvSpPr>
+          <p:nvPr>
+            <p:ph type="body" idx="1"/>
+          </p:nvPr>
+        </p:nvSpPr>
+        <p:spPr bwMode="auto">
+          <a:xfrm>
+            <a:off x="686360" y="4342535"/>
+            <a:ext cx="5486681" cy="4114511"/>
+          </a:xfrm>
+          <a:prstGeom prst="rect">
+            <a:avLst/>
+          </a:prstGeom>
+          <a:noFill/>
+          <a:ln>
+            <a:round/>
+            <a:headEnd/>
+            <a:tailEnd/>
+          </a:ln>
+        </p:spPr>
+        <p:txBody>
+          <a:bodyPr wrap="none" anchor="ctr"/>
+          <a:lstStyle/>
+          <a:p>
+            <a:endParaRPr lang="en-US"/>
+          </a:p>
+        </p:txBody>
+      </p:sp>
+    </p:spTree>
+  </p:cSld>
+  <p:clrMapOvr>
+    <a:masterClrMapping/>
+  </p:clrMapOvr>
+</p:notes>
+</file>
+
+<file path=ppt/notesSlides/notesSlide11.xml><?xml version="1.0" encoding="utf-8"?>
+<p:notes xmlns:a="http://schemas.openxmlformats.org/drawingml/2006/main" xmlns:r="http://schemas.openxmlformats.org/officeDocument/2006/relationships" xmlns:p="http://schemas.openxmlformats.org/presentationml/2006/main">
+  <p:cSld>
+    <p:bg>
+      <p:bgPr>
+        <a:solidFill>
+          <a:srgbClr val="FFFFFF"/>
+        </a:solidFill>
+        <a:effectLst/>
+      </p:bgPr>
+    </p:bg>
+    <p:spTree>
+      <p:nvGrpSpPr>
+        <p:cNvPr id="1" name=""/>
+        <p:cNvGrpSpPr/>
+        <p:nvPr/>
+      </p:nvGrpSpPr>
+      <p:grpSpPr>
+        <a:xfrm>
+          <a:off x="0" y="0"/>
+          <a:ext cx="0" cy="0"/>
+          <a:chOff x="0" y="0"/>
+          <a:chExt cx="0" cy="0"/>
+        </a:xfrm>
+      </p:grpSpPr>
+      <p:sp>
+        <p:nvSpPr>
+          <p:cNvPr id="7" name="Rectangle 6"/>
+          <p:cNvSpPr>
+            <a:spLocks noGrp="1" noChangeArrowheads="1"/>
+          </p:cNvSpPr>
+          <p:nvPr>
+            <p:ph type="sldNum"/>
+          </p:nvPr>
+        </p:nvSpPr>
+        <p:spPr>
+          <a:ln/>
+        </p:spPr>
+        <p:txBody>
+          <a:bodyPr/>
+          <a:lstStyle/>
+          <a:p>
+            <a:fld id="{F64DA0EC-78EA-4A65-B306-5B730F9A8279}" type="slidenum">
+              <a:rPr lang="en-US"/>
+              <a:pPr/>
+              <a:t>17</a:t>
+            </a:fld>
+            <a:endParaRPr lang="en-US"/>
+          </a:p>
+        </p:txBody>
+      </p:sp>
+      <p:sp>
+        <p:nvSpPr>
+          <p:cNvPr id="17409" name="Rectangle 1"/>
+          <p:cNvSpPr txBox="1">
+            <a:spLocks noGrp="1" noRot="1" noChangeAspect="1" noChangeArrowheads="1"/>
+          </p:cNvSpPr>
+          <p:nvPr>
+            <p:ph type="sldImg"/>
+          </p:nvPr>
+        </p:nvSpPr>
+        <p:spPr bwMode="auto">
+          <a:xfrm>
+            <a:off x="1143000" y="693738"/>
+            <a:ext cx="4572000" cy="3429000"/>
+          </a:xfrm>
+          <a:prstGeom prst="rect">
+            <a:avLst/>
+          </a:prstGeom>
+          <a:solidFill>
+            <a:srgbClr val="FFFFFF"/>
+          </a:solidFill>
+          <a:ln>
+            <a:solidFill>
+              <a:srgbClr val="000000"/>
+            </a:solidFill>
+            <a:miter lim="800000"/>
+            <a:headEnd/>
+            <a:tailEnd/>
+          </a:ln>
+        </p:spPr>
+      </p:sp>
+      <p:sp>
+        <p:nvSpPr>
+          <p:cNvPr id="17410" name="Rectangle 2"/>
+          <p:cNvSpPr txBox="1">
+            <a:spLocks noGrp="1" noChangeArrowheads="1"/>
+          </p:cNvSpPr>
+          <p:nvPr>
+            <p:ph type="body" idx="1"/>
+          </p:nvPr>
+        </p:nvSpPr>
+        <p:spPr bwMode="auto">
+          <a:xfrm>
+            <a:off x="686360" y="4342535"/>
+            <a:ext cx="5486681" cy="4114511"/>
+          </a:xfrm>
+          <a:prstGeom prst="rect">
+            <a:avLst/>
+          </a:prstGeom>
+          <a:noFill/>
+          <a:ln>
+            <a:round/>
+            <a:headEnd/>
+            <a:tailEnd/>
+          </a:ln>
+        </p:spPr>
+        <p:txBody>
+          <a:bodyPr wrap="none" anchor="ctr"/>
+          <a:lstStyle/>
+          <a:p>
+            <a:endParaRPr lang="en-US"/>
+          </a:p>
+        </p:txBody>
+      </p:sp>
+    </p:spTree>
+  </p:cSld>
+  <p:clrMapOvr>
+    <a:masterClrMapping/>
+  </p:clrMapOvr>
+</p:notes>
+</file>
+
+<file path=ppt/notesSlides/notesSlide12.xml><?xml version="1.0" encoding="utf-8"?>
+<p:notes xmlns:a="http://schemas.openxmlformats.org/drawingml/2006/main" xmlns:r="http://schemas.openxmlformats.org/officeDocument/2006/relationships" xmlns:p="http://schemas.openxmlformats.org/presentationml/2006/main">
+  <p:cSld>
+    <p:bg>
+      <p:bgPr>
+        <a:solidFill>
+          <a:srgbClr val="FFFFFF"/>
+        </a:solidFill>
+        <a:effectLst/>
+      </p:bgPr>
+    </p:bg>
+    <p:spTree>
+      <p:nvGrpSpPr>
+        <p:cNvPr id="1" name=""/>
+        <p:cNvGrpSpPr/>
+        <p:nvPr/>
+      </p:nvGrpSpPr>
+      <p:grpSpPr>
+        <a:xfrm>
+          <a:off x="0" y="0"/>
+          <a:ext cx="0" cy="0"/>
+          <a:chOff x="0" y="0"/>
+          <a:chExt cx="0" cy="0"/>
+        </a:xfrm>
+      </p:grpSpPr>
+      <p:sp>
+        <p:nvSpPr>
+          <p:cNvPr id="7" name="Rectangle 6"/>
+          <p:cNvSpPr>
+            <a:spLocks noGrp="1" noChangeArrowheads="1"/>
+          </p:cNvSpPr>
+          <p:nvPr>
+            <p:ph type="sldNum"/>
+          </p:nvPr>
+        </p:nvSpPr>
+        <p:spPr>
+          <a:ln/>
+        </p:spPr>
+        <p:txBody>
+          <a:bodyPr/>
+          <a:lstStyle/>
+          <a:p>
             <a:fld id="{7BA0123D-32C7-4DB6-AFF6-A12E45A91046}" type="slidenum">
               <a:rPr lang="en-US"/>
               <a:pPr/>
@@ -40512,7 +40778,7 @@
 </p:notes>
 </file>
 
-<file path=ppt/notesSlides/notesSlide11.xml><?xml version="1.0" encoding="utf-8"?>
+<file path=ppt/notesSlides/notesSlide13.xml><?xml version="1.0" encoding="utf-8"?>
 <p:notes xmlns:a="http://schemas.openxmlformats.org/drawingml/2006/main" xmlns:r="http://schemas.openxmlformats.org/officeDocument/2006/relationships" xmlns:p="http://schemas.openxmlformats.org/presentationml/2006/main">
   <p:cSld>
     <p:bg>
@@ -40720,14 +40986,6 @@
 <file path=ppt/notesSlides/notesSlide3.xml><?xml version="1.0" encoding="utf-8"?>
 <p:notes xmlns:a="http://schemas.openxmlformats.org/drawingml/2006/main" xmlns:r="http://schemas.openxmlformats.org/officeDocument/2006/relationships" xmlns:p="http://schemas.openxmlformats.org/presentationml/2006/main">
   <p:cSld>
-    <p:bg>
-      <p:bgPr>
-        <a:solidFill>
-          <a:srgbClr val="FFFFFF"/>
-        </a:solidFill>
-        <a:effectLst/>
-      </p:bgPr>
-    </p:bg>
     <p:spTree>
       <p:nvGrpSpPr>
         <p:cNvPr id="1" name=""/>
@@ -40744,90 +41002,73 @@
       </p:grpSpPr>
       <p:sp>
         <p:nvSpPr>
-          <p:cNvPr id="7" name="Rectangle 6"/>
+          <p:cNvPr id="2" name="Slide Image Placeholder 1"/>
           <p:cNvSpPr>
-            <a:spLocks noGrp="1" noChangeArrowheads="1"/>
+            <a:spLocks noGrp="1" noRot="1" noChangeAspect="1"/>
           </p:cNvSpPr>
           <p:nvPr>
-            <p:ph type="sldNum"/>
+            <p:ph type="sldImg"/>
           </p:nvPr>
         </p:nvSpPr>
-        <p:spPr>
-          <a:ln/>
-        </p:spPr>
+        <p:spPr/>
+      </p:sp>
+      <p:sp>
+        <p:nvSpPr>
+          <p:cNvPr id="3" name="Notes Placeholder 2"/>
+          <p:cNvSpPr>
+            <a:spLocks noGrp="1"/>
+          </p:cNvSpPr>
+          <p:nvPr>
+            <p:ph type="body" idx="1"/>
+          </p:nvPr>
+        </p:nvSpPr>
+        <p:spPr/>
         <p:txBody>
-          <a:bodyPr/>
+          <a:bodyPr>
+            <a:normAutofit/>
+          </a:bodyPr>
           <a:lstStyle/>
           <a:p>
-            <a:fld id="{7337F55F-CCE5-458C-99A9-7577E7CE3829}" type="slidenum">
-              <a:rPr lang="en-US"/>
-              <a:pPr/>
-              <a:t>6</a:t>
-            </a:fld>
-            <a:endParaRPr lang="en-US"/>
+            <a:r>
+              <a:rPr lang="en-US" dirty="0" smtClean="0"/>
+              <a:t>Can make the goals as one: Check bus status; make all use cases use one model, have different texts and flows for each; use case model =</a:t>
+            </a:r>
+            <a:r>
+              <a:rPr lang="en-US" baseline="0" dirty="0" smtClean="0"/>
+              <a:t> primary source for functional </a:t>
+            </a:r>
+            <a:r>
+              <a:rPr lang="en-US" baseline="0" dirty="0" err="1" smtClean="0"/>
+              <a:t>req</a:t>
+            </a:r>
+            <a:r>
+              <a:rPr lang="en-US" baseline="0" dirty="0" smtClean="0"/>
+              <a:t>; slide with more circles should express all use cases, actors should be shown</a:t>
+            </a:r>
+            <a:endParaRPr lang="en-US" dirty="0"/>
           </a:p>
         </p:txBody>
       </p:sp>
       <p:sp>
         <p:nvSpPr>
-          <p:cNvPr id="7169" name="Rectangle 1"/>
-          <p:cNvSpPr txBox="1">
-            <a:spLocks noChangeArrowheads="1"/>
+          <p:cNvPr id="4" name="Slide Number Placeholder 3"/>
+          <p:cNvSpPr>
+            <a:spLocks noGrp="1"/>
           </p:cNvSpPr>
           <p:nvPr>
-            <p:ph type="sldImg"/>
+            <p:ph type="sldNum" sz="quarter" idx="10"/>
           </p:nvPr>
         </p:nvSpPr>
-        <p:spPr bwMode="auto">
-          <a:xfrm>
-            <a:off x="1143000" y="693738"/>
-            <a:ext cx="4572000" cy="3429000"/>
-          </a:xfrm>
-          <a:prstGeom prst="rect">
-            <a:avLst/>
-          </a:prstGeom>
-          <a:solidFill>
-            <a:srgbClr val="FFFFFF"/>
-          </a:solidFill>
-          <a:ln>
-            <a:solidFill>
-              <a:srgbClr val="000000"/>
-            </a:solidFill>
-            <a:miter lim="800000"/>
-            <a:headEnd/>
-            <a:tailEnd/>
-          </a:ln>
-        </p:spPr>
-      </p:sp>
-      <p:sp>
-        <p:nvSpPr>
-          <p:cNvPr id="7170" name="Rectangle 2"/>
-          <p:cNvSpPr txBox="1">
-            <a:spLocks noChangeArrowheads="1"/>
-          </p:cNvSpPr>
-          <p:nvPr>
-            <p:ph type="body" idx="1"/>
-          </p:nvPr>
-        </p:nvSpPr>
-        <p:spPr bwMode="auto">
-          <a:xfrm>
-            <a:off x="686360" y="4342535"/>
-            <a:ext cx="5486681" cy="4114511"/>
-          </a:xfrm>
-          <a:prstGeom prst="rect">
-            <a:avLst/>
-          </a:prstGeom>
-          <a:noFill/>
-          <a:ln>
-            <a:round/>
-            <a:headEnd/>
-            <a:tailEnd/>
-          </a:ln>
-        </p:spPr>
+        <p:spPr/>
         <p:txBody>
-          <a:bodyPr wrap="none" anchor="ctr"/>
+          <a:bodyPr/>
           <a:lstStyle/>
           <a:p>
+            <a:fld id="{D2C20754-2859-45A8-8015-4CC934F73286}" type="slidenum">
+              <a:rPr lang="en-US" smtClean="0"/>
+              <a:pPr/>
+              <a:t>4</a:t>
+            </a:fld>
             <a:endParaRPr lang="en-US"/>
           </a:p>
         </p:txBody>
@@ -40882,7 +41123,7 @@
           <a:bodyPr/>
           <a:lstStyle/>
           <a:p>
-            <a:fld id="{8F217465-728F-4626-A775-351C55DFB4C5}" type="slidenum">
+            <a:fld id="{7337F55F-CCE5-458C-99A9-7577E7CE3829}" type="slidenum">
               <a:rPr lang="en-US"/>
               <a:pPr/>
               <a:t>7</a:t>
@@ -40893,9 +41134,9 @@
       </p:sp>
       <p:sp>
         <p:nvSpPr>
-          <p:cNvPr id="8193" name="Rectangle 1"/>
+          <p:cNvPr id="7169" name="Rectangle 1"/>
           <p:cNvSpPr txBox="1">
-            <a:spLocks noChangeArrowheads="1"/>
+            <a:spLocks noGrp="1" noRot="1" noChangeAspect="1" noChangeArrowheads="1"/>
           </p:cNvSpPr>
           <p:nvPr>
             <p:ph type="sldImg"/>
@@ -40903,8 +41144,8 @@
         </p:nvSpPr>
         <p:spPr bwMode="auto">
           <a:xfrm>
-            <a:off x="1210236" y="694171"/>
-            <a:ext cx="4437529" cy="3429000"/>
+            <a:off x="1143000" y="693738"/>
+            <a:ext cx="4572000" cy="3429000"/>
           </a:xfrm>
           <a:prstGeom prst="rect">
             <a:avLst/>
@@ -40924,9 +41165,9 @@
       </p:sp>
       <p:sp>
         <p:nvSpPr>
-          <p:cNvPr id="8194" name="Rectangle 2"/>
+          <p:cNvPr id="7170" name="Rectangle 2"/>
           <p:cNvSpPr txBox="1">
-            <a:spLocks noChangeArrowheads="1"/>
+            <a:spLocks noGrp="1" noChangeArrowheads="1"/>
           </p:cNvSpPr>
           <p:nvPr>
             <p:ph type="body" idx="1"/>
@@ -40964,6 +41205,129 @@
 </file>
 
 <file path=ppt/notesSlides/notesSlide5.xml><?xml version="1.0" encoding="utf-8"?>
+<p:notes xmlns:a="http://schemas.openxmlformats.org/drawingml/2006/main" xmlns:r="http://schemas.openxmlformats.org/officeDocument/2006/relationships" xmlns:p="http://schemas.openxmlformats.org/presentationml/2006/main">
+  <p:cSld>
+    <p:bg>
+      <p:bgPr>
+        <a:solidFill>
+          <a:srgbClr val="FFFFFF"/>
+        </a:solidFill>
+        <a:effectLst/>
+      </p:bgPr>
+    </p:bg>
+    <p:spTree>
+      <p:nvGrpSpPr>
+        <p:cNvPr id="1" name=""/>
+        <p:cNvGrpSpPr/>
+        <p:nvPr/>
+      </p:nvGrpSpPr>
+      <p:grpSpPr>
+        <a:xfrm>
+          <a:off x="0" y="0"/>
+          <a:ext cx="0" cy="0"/>
+          <a:chOff x="0" y="0"/>
+          <a:chExt cx="0" cy="0"/>
+        </a:xfrm>
+      </p:grpSpPr>
+      <p:sp>
+        <p:nvSpPr>
+          <p:cNvPr id="7" name="Rectangle 6"/>
+          <p:cNvSpPr>
+            <a:spLocks noGrp="1" noChangeArrowheads="1"/>
+          </p:cNvSpPr>
+          <p:nvPr>
+            <p:ph type="sldNum"/>
+          </p:nvPr>
+        </p:nvSpPr>
+        <p:spPr>
+          <a:ln/>
+        </p:spPr>
+        <p:txBody>
+          <a:bodyPr/>
+          <a:lstStyle/>
+          <a:p>
+            <a:fld id="{8F217465-728F-4626-A775-351C55DFB4C5}" type="slidenum">
+              <a:rPr lang="en-US"/>
+              <a:pPr/>
+              <a:t>8</a:t>
+            </a:fld>
+            <a:endParaRPr lang="en-US"/>
+          </a:p>
+        </p:txBody>
+      </p:sp>
+      <p:sp>
+        <p:nvSpPr>
+          <p:cNvPr id="8193" name="Rectangle 1"/>
+          <p:cNvSpPr txBox="1">
+            <a:spLocks noGrp="1" noRot="1" noChangeAspect="1" noChangeArrowheads="1"/>
+          </p:cNvSpPr>
+          <p:nvPr>
+            <p:ph type="sldImg"/>
+          </p:nvPr>
+        </p:nvSpPr>
+        <p:spPr bwMode="auto">
+          <a:xfrm>
+            <a:off x="1143000" y="693738"/>
+            <a:ext cx="4572000" cy="3429000"/>
+          </a:xfrm>
+          <a:prstGeom prst="rect">
+            <a:avLst/>
+          </a:prstGeom>
+          <a:solidFill>
+            <a:srgbClr val="FFFFFF"/>
+          </a:solidFill>
+          <a:ln>
+            <a:solidFill>
+              <a:srgbClr val="000000"/>
+            </a:solidFill>
+            <a:miter lim="800000"/>
+            <a:headEnd/>
+            <a:tailEnd/>
+          </a:ln>
+        </p:spPr>
+      </p:sp>
+      <p:sp>
+        <p:nvSpPr>
+          <p:cNvPr id="8194" name="Rectangle 2"/>
+          <p:cNvSpPr txBox="1">
+            <a:spLocks noGrp="1" noChangeArrowheads="1"/>
+          </p:cNvSpPr>
+          <p:nvPr>
+            <p:ph type="body" idx="1"/>
+          </p:nvPr>
+        </p:nvSpPr>
+        <p:spPr bwMode="auto">
+          <a:xfrm>
+            <a:off x="686360" y="4342535"/>
+            <a:ext cx="5486681" cy="4114511"/>
+          </a:xfrm>
+          <a:prstGeom prst="rect">
+            <a:avLst/>
+          </a:prstGeom>
+          <a:noFill/>
+          <a:ln>
+            <a:round/>
+            <a:headEnd/>
+            <a:tailEnd/>
+          </a:ln>
+        </p:spPr>
+        <p:txBody>
+          <a:bodyPr wrap="none" anchor="ctr"/>
+          <a:lstStyle/>
+          <a:p>
+            <a:endParaRPr lang="en-US"/>
+          </a:p>
+        </p:txBody>
+      </p:sp>
+    </p:spTree>
+  </p:cSld>
+  <p:clrMapOvr>
+    <a:masterClrMapping/>
+  </p:clrMapOvr>
+</p:notes>
+</file>
+
+<file path=ppt/notesSlides/notesSlide6.xml><?xml version="1.0" encoding="utf-8"?>
 <p:notes xmlns:a="http://schemas.openxmlformats.org/drawingml/2006/main" xmlns:r="http://schemas.openxmlformats.org/officeDocument/2006/relationships" xmlns:p="http://schemas.openxmlformats.org/presentationml/2006/main">
   <p:cSld>
     <p:spTree>
@@ -41009,6 +41373,104 @@
           </a:bodyPr>
           <a:lstStyle/>
           <a:p>
+            <a:r>
+              <a:rPr lang="en-US" dirty="0" smtClean="0"/>
+              <a:t>Want rider to be able to rely on this, so base</a:t>
+            </a:r>
+            <a:r>
+              <a:rPr lang="en-US" baseline="0" dirty="0" smtClean="0"/>
+              <a:t> MTBF off this, exact info will be given by McDonald</a:t>
+            </a:r>
+            <a:endParaRPr lang="en-US" dirty="0"/>
+          </a:p>
+        </p:txBody>
+      </p:sp>
+      <p:sp>
+        <p:nvSpPr>
+          <p:cNvPr id="4" name="Slide Number Placeholder 3"/>
+          <p:cNvSpPr>
+            <a:spLocks noGrp="1"/>
+          </p:cNvSpPr>
+          <p:nvPr>
+            <p:ph type="sldNum" sz="quarter" idx="10"/>
+          </p:nvPr>
+        </p:nvSpPr>
+        <p:spPr/>
+        <p:txBody>
+          <a:bodyPr/>
+          <a:lstStyle/>
+          <a:p>
+            <a:fld id="{D2C20754-2859-45A8-8015-4CC934F73286}" type="slidenum">
+              <a:rPr lang="en-US" smtClean="0"/>
+              <a:pPr/>
+              <a:t>10</a:t>
+            </a:fld>
+            <a:endParaRPr lang="en-US"/>
+          </a:p>
+        </p:txBody>
+      </p:sp>
+    </p:spTree>
+  </p:cSld>
+  <p:clrMapOvr>
+    <a:masterClrMapping/>
+  </p:clrMapOvr>
+</p:notes>
+</file>
+
+<file path=ppt/notesSlides/notesSlide7.xml><?xml version="1.0" encoding="utf-8"?>
+<p:notes xmlns:a="http://schemas.openxmlformats.org/drawingml/2006/main" xmlns:r="http://schemas.openxmlformats.org/officeDocument/2006/relationships" xmlns:p="http://schemas.openxmlformats.org/presentationml/2006/main">
+  <p:cSld>
+    <p:spTree>
+      <p:nvGrpSpPr>
+        <p:cNvPr id="1" name=""/>
+        <p:cNvGrpSpPr/>
+        <p:nvPr/>
+      </p:nvGrpSpPr>
+      <p:grpSpPr>
+        <a:xfrm>
+          <a:off x="0" y="0"/>
+          <a:ext cx="0" cy="0"/>
+          <a:chOff x="0" y="0"/>
+          <a:chExt cx="0" cy="0"/>
+        </a:xfrm>
+      </p:grpSpPr>
+      <p:sp>
+        <p:nvSpPr>
+          <p:cNvPr id="2" name="Slide Image Placeholder 1"/>
+          <p:cNvSpPr>
+            <a:spLocks noGrp="1" noRot="1" noChangeAspect="1"/>
+          </p:cNvSpPr>
+          <p:nvPr>
+            <p:ph type="sldImg"/>
+          </p:nvPr>
+        </p:nvSpPr>
+        <p:spPr/>
+      </p:sp>
+      <p:sp>
+        <p:nvSpPr>
+          <p:cNvPr id="3" name="Notes Placeholder 2"/>
+          <p:cNvSpPr>
+            <a:spLocks noGrp="1"/>
+          </p:cNvSpPr>
+          <p:nvPr>
+            <p:ph type="body" idx="1"/>
+          </p:nvPr>
+        </p:nvSpPr>
+        <p:spPr/>
+        <p:txBody>
+          <a:bodyPr>
+            <a:normAutofit/>
+          </a:bodyPr>
+          <a:lstStyle/>
+          <a:p>
+            <a:r>
+              <a:rPr lang="en-US" dirty="0" smtClean="0"/>
+              <a:t>There</a:t>
+            </a:r>
+            <a:r>
+              <a:rPr lang="en-US" baseline="0" dirty="0" smtClean="0"/>
+              <a:t> are people at school who have done android development for databases (Mike Weaver, Craig Williams, Dominic)</a:t>
+            </a:r>
             <a:endParaRPr lang="en-US" dirty="0"/>
           </a:p>
         </p:txBody>
@@ -41031,7 +41493,7 @@
             <a:fld id="{CB7D4244-23A8-4EAC-AE97-3623EC42045E}" type="slidenum">
               <a:rPr lang="en-US" smtClean="0"/>
               <a:pPr/>
-              <a:t>10</a:t>
+              <a:t>11</a:t>
             </a:fld>
             <a:endParaRPr lang="en-US"/>
           </a:p>
@@ -41045,7 +41507,7 @@
 </p:notes>
 </file>
 
-<file path=ppt/notesSlides/notesSlide6.xml><?xml version="1.0" encoding="utf-8"?>
+<file path=ppt/notesSlides/notesSlide8.xml><?xml version="1.0" encoding="utf-8"?>
 <p:notes xmlns:a="http://schemas.openxmlformats.org/drawingml/2006/main" xmlns:r="http://schemas.openxmlformats.org/officeDocument/2006/relationships" xmlns:p="http://schemas.openxmlformats.org/presentationml/2006/main">
   <p:cSld>
     <p:spTree>
@@ -41129,7 +41591,7 @@
             <a:fld id="{CB7D4244-23A8-4EAC-AE97-3623EC42045E}" type="slidenum">
               <a:rPr lang="en-US" smtClean="0"/>
               <a:pPr/>
-              <a:t>11</a:t>
+              <a:t>12</a:t>
             </a:fld>
             <a:endParaRPr lang="en-US"/>
           </a:p>
@@ -41143,7 +41605,7 @@
 </p:notes>
 </file>
 
-<file path=ppt/notesSlides/notesSlide7.xml><?xml version="1.0" encoding="utf-8"?>
+<file path=ppt/notesSlides/notesSlide9.xml><?xml version="1.0" encoding="utf-8"?>
 <p:notes xmlns:a="http://schemas.openxmlformats.org/drawingml/2006/main" xmlns:r="http://schemas.openxmlformats.org/officeDocument/2006/relationships" xmlns:p="http://schemas.openxmlformats.org/presentationml/2006/main">
   <p:cSld>
     <p:bg>
@@ -41228,252 +41690,6 @@
       <p:sp>
         <p:nvSpPr>
           <p:cNvPr id="22530" name="Rectangle 2"/>
-          <p:cNvSpPr txBox="1">
-            <a:spLocks noGrp="1" noChangeArrowheads="1"/>
-          </p:cNvSpPr>
-          <p:nvPr>
-            <p:ph type="body" idx="1"/>
-          </p:nvPr>
-        </p:nvSpPr>
-        <p:spPr bwMode="auto">
-          <a:xfrm>
-            <a:off x="686360" y="4342535"/>
-            <a:ext cx="5486681" cy="4114511"/>
-          </a:xfrm>
-          <a:prstGeom prst="rect">
-            <a:avLst/>
-          </a:prstGeom>
-          <a:noFill/>
-          <a:ln>
-            <a:round/>
-            <a:headEnd/>
-            <a:tailEnd/>
-          </a:ln>
-        </p:spPr>
-        <p:txBody>
-          <a:bodyPr wrap="none" anchor="ctr"/>
-          <a:lstStyle/>
-          <a:p>
-            <a:endParaRPr lang="en-US"/>
-          </a:p>
-        </p:txBody>
-      </p:sp>
-    </p:spTree>
-  </p:cSld>
-  <p:clrMapOvr>
-    <a:masterClrMapping/>
-  </p:clrMapOvr>
-</p:notes>
-</file>
-
-<file path=ppt/notesSlides/notesSlide8.xml><?xml version="1.0" encoding="utf-8"?>
-<p:notes xmlns:a="http://schemas.openxmlformats.org/drawingml/2006/main" xmlns:r="http://schemas.openxmlformats.org/officeDocument/2006/relationships" xmlns:p="http://schemas.openxmlformats.org/presentationml/2006/main">
-  <p:cSld>
-    <p:bg>
-      <p:bgPr>
-        <a:solidFill>
-          <a:srgbClr val="FFFFFF"/>
-        </a:solidFill>
-        <a:effectLst/>
-      </p:bgPr>
-    </p:bg>
-    <p:spTree>
-      <p:nvGrpSpPr>
-        <p:cNvPr id="1" name=""/>
-        <p:cNvGrpSpPr/>
-        <p:nvPr/>
-      </p:nvGrpSpPr>
-      <p:grpSpPr>
-        <a:xfrm>
-          <a:off x="0" y="0"/>
-          <a:ext cx="0" cy="0"/>
-          <a:chOff x="0" y="0"/>
-          <a:chExt cx="0" cy="0"/>
-        </a:xfrm>
-      </p:grpSpPr>
-      <p:sp>
-        <p:nvSpPr>
-          <p:cNvPr id="7" name="Rectangle 6"/>
-          <p:cNvSpPr>
-            <a:spLocks noGrp="1" noChangeArrowheads="1"/>
-          </p:cNvSpPr>
-          <p:nvPr>
-            <p:ph type="sldNum"/>
-          </p:nvPr>
-        </p:nvSpPr>
-        <p:spPr>
-          <a:ln/>
-        </p:spPr>
-        <p:txBody>
-          <a:bodyPr/>
-          <a:lstStyle/>
-          <a:p>
-            <a:fld id="{84F354D4-1058-47E6-822B-B270E01C7F3F}" type="slidenum">
-              <a:rPr lang="en-US"/>
-              <a:pPr/>
-              <a:t>16</a:t>
-            </a:fld>
-            <a:endParaRPr lang="en-US"/>
-          </a:p>
-        </p:txBody>
-      </p:sp>
-      <p:sp>
-        <p:nvSpPr>
-          <p:cNvPr id="19457" name="Rectangle 1"/>
-          <p:cNvSpPr txBox="1">
-            <a:spLocks noGrp="1" noRot="1" noChangeAspect="1" noChangeArrowheads="1"/>
-          </p:cNvSpPr>
-          <p:nvPr>
-            <p:ph type="sldImg"/>
-          </p:nvPr>
-        </p:nvSpPr>
-        <p:spPr bwMode="auto">
-          <a:xfrm>
-            <a:off x="1143000" y="693738"/>
-            <a:ext cx="4572000" cy="3429000"/>
-          </a:xfrm>
-          <a:prstGeom prst="rect">
-            <a:avLst/>
-          </a:prstGeom>
-          <a:solidFill>
-            <a:srgbClr val="FFFFFF"/>
-          </a:solidFill>
-          <a:ln>
-            <a:solidFill>
-              <a:srgbClr val="000000"/>
-            </a:solidFill>
-            <a:miter lim="800000"/>
-            <a:headEnd/>
-            <a:tailEnd/>
-          </a:ln>
-        </p:spPr>
-      </p:sp>
-      <p:sp>
-        <p:nvSpPr>
-          <p:cNvPr id="19458" name="Rectangle 2"/>
-          <p:cNvSpPr txBox="1">
-            <a:spLocks noGrp="1" noChangeArrowheads="1"/>
-          </p:cNvSpPr>
-          <p:nvPr>
-            <p:ph type="body" idx="1"/>
-          </p:nvPr>
-        </p:nvSpPr>
-        <p:spPr bwMode="auto">
-          <a:xfrm>
-            <a:off x="686360" y="4342535"/>
-            <a:ext cx="5486681" cy="4114511"/>
-          </a:xfrm>
-          <a:prstGeom prst="rect">
-            <a:avLst/>
-          </a:prstGeom>
-          <a:noFill/>
-          <a:ln>
-            <a:round/>
-            <a:headEnd/>
-            <a:tailEnd/>
-          </a:ln>
-        </p:spPr>
-        <p:txBody>
-          <a:bodyPr wrap="none" anchor="ctr"/>
-          <a:lstStyle/>
-          <a:p>
-            <a:endParaRPr lang="en-US"/>
-          </a:p>
-        </p:txBody>
-      </p:sp>
-    </p:spTree>
-  </p:cSld>
-  <p:clrMapOvr>
-    <a:masterClrMapping/>
-  </p:clrMapOvr>
-</p:notes>
-</file>
-
-<file path=ppt/notesSlides/notesSlide9.xml><?xml version="1.0" encoding="utf-8"?>
-<p:notes xmlns:a="http://schemas.openxmlformats.org/drawingml/2006/main" xmlns:r="http://schemas.openxmlformats.org/officeDocument/2006/relationships" xmlns:p="http://schemas.openxmlformats.org/presentationml/2006/main">
-  <p:cSld>
-    <p:bg>
-      <p:bgPr>
-        <a:solidFill>
-          <a:srgbClr val="FFFFFF"/>
-        </a:solidFill>
-        <a:effectLst/>
-      </p:bgPr>
-    </p:bg>
-    <p:spTree>
-      <p:nvGrpSpPr>
-        <p:cNvPr id="1" name=""/>
-        <p:cNvGrpSpPr/>
-        <p:nvPr/>
-      </p:nvGrpSpPr>
-      <p:grpSpPr>
-        <a:xfrm>
-          <a:off x="0" y="0"/>
-          <a:ext cx="0" cy="0"/>
-          <a:chOff x="0" y="0"/>
-          <a:chExt cx="0" cy="0"/>
-        </a:xfrm>
-      </p:grpSpPr>
-      <p:sp>
-        <p:nvSpPr>
-          <p:cNvPr id="7" name="Rectangle 6"/>
-          <p:cNvSpPr>
-            <a:spLocks noGrp="1" noChangeArrowheads="1"/>
-          </p:cNvSpPr>
-          <p:nvPr>
-            <p:ph type="sldNum"/>
-          </p:nvPr>
-        </p:nvSpPr>
-        <p:spPr>
-          <a:ln/>
-        </p:spPr>
-        <p:txBody>
-          <a:bodyPr/>
-          <a:lstStyle/>
-          <a:p>
-            <a:fld id="{F64DA0EC-78EA-4A65-B306-5B730F9A8279}" type="slidenum">
-              <a:rPr lang="en-US"/>
-              <a:pPr/>
-              <a:t>17</a:t>
-            </a:fld>
-            <a:endParaRPr lang="en-US"/>
-          </a:p>
-        </p:txBody>
-      </p:sp>
-      <p:sp>
-        <p:nvSpPr>
-          <p:cNvPr id="17409" name="Rectangle 1"/>
-          <p:cNvSpPr txBox="1">
-            <a:spLocks noGrp="1" noRot="1" noChangeAspect="1" noChangeArrowheads="1"/>
-          </p:cNvSpPr>
-          <p:nvPr>
-            <p:ph type="sldImg"/>
-          </p:nvPr>
-        </p:nvSpPr>
-        <p:spPr bwMode="auto">
-          <a:xfrm>
-            <a:off x="1143000" y="693738"/>
-            <a:ext cx="4572000" cy="3429000"/>
-          </a:xfrm>
-          <a:prstGeom prst="rect">
-            <a:avLst/>
-          </a:prstGeom>
-          <a:solidFill>
-            <a:srgbClr val="FFFFFF"/>
-          </a:solidFill>
-          <a:ln>
-            <a:solidFill>
-              <a:srgbClr val="000000"/>
-            </a:solidFill>
-            <a:miter lim="800000"/>
-            <a:headEnd/>
-            <a:tailEnd/>
-          </a:ln>
-        </p:spPr>
-      </p:sp>
-      <p:sp>
-        <p:nvSpPr>
-          <p:cNvPr id="17410" name="Rectangle 2"/>
           <p:cNvSpPr txBox="1">
             <a:spLocks noGrp="1" noChangeArrowheads="1"/>
           </p:cNvSpPr>
@@ -44497,6 +44713,91 @@
           <a:chExt cx="0" cy="0"/>
         </a:xfrm>
       </p:grpSpPr>
+      <p:graphicFrame>
+        <p:nvGraphicFramePr>
+          <p:cNvPr id="4" name="Content Placeholder 3"/>
+          <p:cNvGraphicFramePr>
+            <a:graphicFrameLocks noGrp="1"/>
+          </p:cNvGraphicFramePr>
+          <p:nvPr>
+            <p:ph idx="1"/>
+          </p:nvPr>
+        </p:nvGraphicFramePr>
+        <p:xfrm>
+          <a:off x="457200" y="1143000"/>
+          <a:ext cx="8153400" cy="5181599"/>
+        </p:xfrm>
+        <a:graphic>
+          <a:graphicData uri="http://schemas.openxmlformats.org/drawingml/2006/diagram">
+            <dgm:relIds xmlns:dgm="http://schemas.openxmlformats.org/drawingml/2006/diagram" xmlns:r="http://schemas.openxmlformats.org/officeDocument/2006/relationships" r:dm="rId3" r:lo="rId4" r:qs="rId5" r:cs="rId6"/>
+          </a:graphicData>
+        </a:graphic>
+      </p:graphicFrame>
+      <p:sp>
+        <p:nvSpPr>
+          <p:cNvPr id="6" name="Title 1"/>
+          <p:cNvSpPr>
+            <a:spLocks noGrp="1"/>
+          </p:cNvSpPr>
+          <p:nvPr>
+            <p:ph type="title"/>
+          </p:nvPr>
+        </p:nvSpPr>
+        <p:spPr>
+          <a:xfrm>
+            <a:off x="457200" y="274638"/>
+            <a:ext cx="8229600" cy="1143000"/>
+          </a:xfrm>
+        </p:spPr>
+        <p:txBody>
+          <a:bodyPr>
+            <a:normAutofit/>
+          </a:bodyPr>
+          <a:lstStyle/>
+          <a:p>
+            <a:r>
+              <a:rPr lang="en-US" altLang="zh-CN" sz="3600" b="1" dirty="0" smtClean="0"/>
+              <a:t>Nonfunctional Requirements</a:t>
+            </a:r>
+            <a:endParaRPr lang="zh-CN" altLang="en-US" sz="3600" b="1" dirty="0"/>
+          </a:p>
+        </p:txBody>
+      </p:sp>
+    </p:spTree>
+  </p:cSld>
+  <p:clrMapOvr>
+    <a:masterClrMapping/>
+  </p:clrMapOvr>
+  <p:transition>
+    <p:fade thruBlk="1"/>
+  </p:transition>
+  <p:timing>
+    <p:tnLst>
+      <p:par>
+        <p:cTn id="1" dur="indefinite" restart="never" nodeType="tmRoot"/>
+      </p:par>
+    </p:tnLst>
+  </p:timing>
+</p:sld>
+</file>
+
+<file path=ppt/slides/slide11.xml><?xml version="1.0" encoding="utf-8"?>
+<p:sld xmlns:a="http://schemas.openxmlformats.org/drawingml/2006/main" xmlns:r="http://schemas.openxmlformats.org/officeDocument/2006/relationships" xmlns:p="http://schemas.openxmlformats.org/presentationml/2006/main">
+  <p:cSld>
+    <p:spTree>
+      <p:nvGrpSpPr>
+        <p:cNvPr id="1" name=""/>
+        <p:cNvGrpSpPr/>
+        <p:nvPr/>
+      </p:nvGrpSpPr>
+      <p:grpSpPr>
+        <a:xfrm>
+          <a:off x="0" y="0"/>
+          <a:ext cx="0" cy="0"/>
+          <a:chOff x="0" y="0"/>
+          <a:chExt cx="0" cy="0"/>
+        </a:xfrm>
+      </p:grpSpPr>
       <p:sp>
         <p:nvSpPr>
           <p:cNvPr id="2" name="Title 1"/>
@@ -44563,7 +44864,7 @@
 </p:sld>
 </file>
 
-<file path=ppt/slides/slide11.xml><?xml version="1.0" encoding="utf-8"?>
+<file path=ppt/slides/slide12.xml><?xml version="1.0" encoding="utf-8"?>
 <p:sld xmlns:a="http://schemas.openxmlformats.org/drawingml/2006/main" xmlns:r="http://schemas.openxmlformats.org/officeDocument/2006/relationships" xmlns:p="http://schemas.openxmlformats.org/presentationml/2006/main">
   <p:cSld>
     <p:spTree>
@@ -44709,129 +45010,6 @@
 </p:sld>
 </file>
 
-<file path=ppt/slides/slide12.xml><?xml version="1.0" encoding="utf-8"?>
-<p:sld xmlns:a="http://schemas.openxmlformats.org/drawingml/2006/main" xmlns:r="http://schemas.openxmlformats.org/officeDocument/2006/relationships" xmlns:p="http://schemas.openxmlformats.org/presentationml/2006/main">
-  <p:cSld>
-    <p:spTree>
-      <p:nvGrpSpPr>
-        <p:cNvPr id="1" name=""/>
-        <p:cNvGrpSpPr/>
-        <p:nvPr/>
-      </p:nvGrpSpPr>
-      <p:grpSpPr>
-        <a:xfrm>
-          <a:off x="0" y="0"/>
-          <a:ext cx="0" cy="0"/>
-          <a:chOff x="0" y="0"/>
-          <a:chExt cx="0" cy="0"/>
-        </a:xfrm>
-      </p:grpSpPr>
-      <p:pic>
-        <p:nvPicPr>
-          <p:cNvPr id="2053" name="Picture 5"/>
-          <p:cNvPicPr>
-            <a:picLocks noChangeAspect="1" noChangeArrowheads="1"/>
-          </p:cNvPicPr>
-          <p:nvPr/>
-        </p:nvPicPr>
-        <p:blipFill>
-          <a:blip r:embed="rId2" cstate="print"/>
-          <a:srcRect/>
-          <a:stretch>
-            <a:fillRect/>
-          </a:stretch>
-        </p:blipFill>
-        <p:spPr bwMode="auto">
-          <a:xfrm>
-            <a:off x="0" y="-1"/>
-            <a:ext cx="9144000" cy="7543801"/>
-          </a:xfrm>
-          <a:prstGeom prst="rect">
-            <a:avLst/>
-          </a:prstGeom>
-          <a:noFill/>
-          <a:ln w="9525">
-            <a:noFill/>
-            <a:miter lim="800000"/>
-            <a:headEnd/>
-            <a:tailEnd/>
-          </a:ln>
-        </p:spPr>
-      </p:pic>
-      <p:sp>
-        <p:nvSpPr>
-          <p:cNvPr id="3" name="Content Placeholder 2"/>
-          <p:cNvSpPr>
-            <a:spLocks noGrp="1"/>
-          </p:cNvSpPr>
-          <p:nvPr>
-            <p:ph idx="1"/>
-          </p:nvPr>
-        </p:nvSpPr>
-        <p:spPr>
-          <a:xfrm>
-            <a:off x="685800" y="304800"/>
-            <a:ext cx="7239000" cy="685800"/>
-          </a:xfrm>
-        </p:spPr>
-        <p:txBody>
-          <a:bodyPr>
-            <a:noAutofit/>
-          </a:bodyPr>
-          <a:lstStyle/>
-          <a:p>
-            <a:pPr algn="ctr">
-              <a:buNone/>
-            </a:pPr>
-            <a:r>
-              <a:rPr lang="en-US" altLang="zh-CN" b="1" u="sng" dirty="0" smtClean="0"/>
-              <a:t>Brief Format </a:t>
-            </a:r>
-            <a:r>
-              <a:rPr lang="en-US" altLang="zh-CN" b="1" dirty="0" smtClean="0"/>
-              <a:t>Use Case Description </a:t>
-            </a:r>
-          </a:p>
-          <a:p>
-            <a:pPr>
-              <a:buNone/>
-            </a:pPr>
-            <a:r>
-              <a:rPr lang="en-US" altLang="zh-CN" dirty="0"/>
-              <a:t>	</a:t>
-            </a:r>
-            <a:endParaRPr lang="en-US" altLang="zh-CN" dirty="0" smtClean="0"/>
-          </a:p>
-          <a:p>
-            <a:pPr>
-              <a:buNone/>
-            </a:pPr>
-            <a:r>
-              <a:rPr lang="en-US" altLang="zh-CN" dirty="0"/>
-              <a:t>	</a:t>
-            </a:r>
-            <a:endParaRPr lang="zh-CN" altLang="en-US" dirty="0"/>
-          </a:p>
-        </p:txBody>
-      </p:sp>
-    </p:spTree>
-  </p:cSld>
-  <p:clrMapOvr>
-    <a:masterClrMapping/>
-  </p:clrMapOvr>
-  <p:transition>
-    <p:fade thruBlk="1"/>
-  </p:transition>
-  <p:timing>
-    <p:tnLst>
-      <p:par>
-        <p:cTn id="1" dur="indefinite" restart="never" nodeType="tmRoot"/>
-      </p:par>
-    </p:tnLst>
-  </p:timing>
-</p:sld>
-</file>
-
 <file path=ppt/slides/slide13.xml><?xml version="1.0" encoding="utf-8"?>
 <p:sld xmlns:a="http://schemas.openxmlformats.org/drawingml/2006/main" xmlns:r="http://schemas.openxmlformats.org/officeDocument/2006/relationships" xmlns:p="http://schemas.openxmlformats.org/presentationml/2006/main">
   <p:cSld>
@@ -44902,7 +45080,7 @@
           <p:nvPr/>
         </p:nvPicPr>
         <p:blipFill>
-          <a:blip r:embed="rId3" cstate="print">
+          <a:blip r:embed="rId4" cstate="print">
             <a:lum contrast="35000"/>
           </a:blip>
           <a:srcRect/>
@@ -45460,7 +45638,7 @@
         </p:xfrm>
         <a:graphic>
           <a:graphicData uri="http://schemas.openxmlformats.org/drawingml/2006/diagram">
-            <dgm:relIds xmlns:dgm="http://schemas.openxmlformats.org/drawingml/2006/diagram" xmlns:r="http://schemas.openxmlformats.org/officeDocument/2006/relationships" r:dm="rId3" r:lo="rId4" r:qs="rId5" r:cs="rId6"/>
+            <dgm:relIds xmlns:dgm="http://schemas.openxmlformats.org/drawingml/2006/diagram" xmlns:r="http://schemas.openxmlformats.org/officeDocument/2006/relationships" r:dm="rId4" r:lo="rId5" r:qs="rId6" r:cs="rId7"/>
           </a:graphicData>
         </a:graphic>
       </p:graphicFrame>
@@ -45784,7 +45962,7 @@
         </p:xfrm>
         <a:graphic>
           <a:graphicData uri="http://schemas.openxmlformats.org/drawingml/2006/diagram">
-            <dgm:relIds xmlns:dgm="http://schemas.openxmlformats.org/drawingml/2006/diagram" xmlns:r="http://schemas.openxmlformats.org/officeDocument/2006/relationships" r:dm="rId3" r:lo="rId4" r:qs="rId5" r:cs="rId6"/>
+            <dgm:relIds xmlns:dgm="http://schemas.openxmlformats.org/drawingml/2006/diagram" xmlns:r="http://schemas.openxmlformats.org/officeDocument/2006/relationships" r:dm="rId4" r:lo="rId5" r:qs="rId6" r:cs="rId7"/>
           </a:graphicData>
         </a:graphic>
       </p:graphicFrame>
@@ -46368,7 +46546,7 @@
         </p:xfrm>
         <a:graphic>
           <a:graphicData uri="http://schemas.openxmlformats.org/drawingml/2006/diagram">
-            <dgm:relIds xmlns:dgm="http://schemas.openxmlformats.org/drawingml/2006/diagram" xmlns:r="http://schemas.openxmlformats.org/officeDocument/2006/relationships" r:dm="rId2" r:lo="rId3" r:qs="rId4" r:cs="rId5"/>
+            <dgm:relIds xmlns:dgm="http://schemas.openxmlformats.org/drawingml/2006/diagram" xmlns:r="http://schemas.openxmlformats.org/officeDocument/2006/relationships" r:dm="rId3" r:lo="rId4" r:qs="rId5" r:cs="rId6"/>
           </a:graphicData>
         </a:graphic>
       </p:graphicFrame>
@@ -46507,6 +46685,129 @@
           <a:chExt cx="0" cy="0"/>
         </a:xfrm>
       </p:grpSpPr>
+      <p:pic>
+        <p:nvPicPr>
+          <p:cNvPr id="2053" name="Picture 5"/>
+          <p:cNvPicPr>
+            <a:picLocks noChangeAspect="1" noChangeArrowheads="1"/>
+          </p:cNvPicPr>
+          <p:nvPr/>
+        </p:nvPicPr>
+        <p:blipFill>
+          <a:blip r:embed="rId2" cstate="print"/>
+          <a:srcRect/>
+          <a:stretch>
+            <a:fillRect/>
+          </a:stretch>
+        </p:blipFill>
+        <p:spPr bwMode="auto">
+          <a:xfrm>
+            <a:off x="0" y="-1"/>
+            <a:ext cx="9144000" cy="7543801"/>
+          </a:xfrm>
+          <a:prstGeom prst="rect">
+            <a:avLst/>
+          </a:prstGeom>
+          <a:noFill/>
+          <a:ln w="9525">
+            <a:noFill/>
+            <a:miter lim="800000"/>
+            <a:headEnd/>
+            <a:tailEnd/>
+          </a:ln>
+        </p:spPr>
+      </p:pic>
+      <p:sp>
+        <p:nvSpPr>
+          <p:cNvPr id="3" name="Content Placeholder 2"/>
+          <p:cNvSpPr>
+            <a:spLocks noGrp="1"/>
+          </p:cNvSpPr>
+          <p:nvPr>
+            <p:ph idx="1"/>
+          </p:nvPr>
+        </p:nvSpPr>
+        <p:spPr>
+          <a:xfrm>
+            <a:off x="685800" y="304800"/>
+            <a:ext cx="7239000" cy="685800"/>
+          </a:xfrm>
+        </p:spPr>
+        <p:txBody>
+          <a:bodyPr>
+            <a:noAutofit/>
+          </a:bodyPr>
+          <a:lstStyle/>
+          <a:p>
+            <a:pPr algn="ctr">
+              <a:buNone/>
+            </a:pPr>
+            <a:r>
+              <a:rPr lang="en-US" altLang="zh-CN" b="1" u="sng" dirty="0" smtClean="0"/>
+              <a:t>Brief Format </a:t>
+            </a:r>
+            <a:r>
+              <a:rPr lang="en-US" altLang="zh-CN" b="1" dirty="0" smtClean="0"/>
+              <a:t>Use Case Description </a:t>
+            </a:r>
+          </a:p>
+          <a:p>
+            <a:pPr>
+              <a:buNone/>
+            </a:pPr>
+            <a:r>
+              <a:rPr lang="en-US" altLang="zh-CN" dirty="0"/>
+              <a:t>	</a:t>
+            </a:r>
+            <a:endParaRPr lang="en-US" altLang="zh-CN" dirty="0" smtClean="0"/>
+          </a:p>
+          <a:p>
+            <a:pPr>
+              <a:buNone/>
+            </a:pPr>
+            <a:r>
+              <a:rPr lang="en-US" altLang="zh-CN" dirty="0"/>
+              <a:t>	</a:t>
+            </a:r>
+            <a:endParaRPr lang="zh-CN" altLang="en-US" dirty="0"/>
+          </a:p>
+        </p:txBody>
+      </p:sp>
+    </p:spTree>
+  </p:cSld>
+  <p:clrMapOvr>
+    <a:masterClrMapping/>
+  </p:clrMapOvr>
+  <p:transition>
+    <p:fade thruBlk="1"/>
+  </p:transition>
+  <p:timing>
+    <p:tnLst>
+      <p:par>
+        <p:cTn id="1" dur="indefinite" restart="never" nodeType="tmRoot"/>
+      </p:par>
+    </p:tnLst>
+  </p:timing>
+</p:sld>
+</file>
+
+<file path=ppt/slides/slide7.xml><?xml version="1.0" encoding="utf-8"?>
+<p:sld xmlns:a="http://schemas.openxmlformats.org/drawingml/2006/main" xmlns:r="http://schemas.openxmlformats.org/officeDocument/2006/relationships" xmlns:p="http://schemas.openxmlformats.org/presentationml/2006/main">
+  <p:cSld>
+    <p:spTree>
+      <p:nvGrpSpPr>
+        <p:cNvPr id="1" name=""/>
+        <p:cNvGrpSpPr/>
+        <p:nvPr/>
+      </p:nvGrpSpPr>
+      <p:grpSpPr>
+        <a:xfrm>
+          <a:off x="0" y="0"/>
+          <a:ext cx="0" cy="0"/>
+          <a:chOff x="0" y="0"/>
+          <a:chExt cx="0" cy="0"/>
+        </a:xfrm>
+      </p:grpSpPr>
       <p:sp>
         <p:nvSpPr>
           <p:cNvPr id="4097" name="Rectangle 1"/>
@@ -46600,7 +46901,7 @@
   <p:timing>
     <p:tnLst>
       <p:par>
-        <p:cTn id="1" dur="indefinite" nodeType="tmRoot">
+        <p:cTn id="1" dur="indefinite" restart="never" nodeType="tmRoot">
           <p:childTnLst>
             <p:seq concurrent="1" nextAc="seek">
               <p:cTn id="2" dur="0" nodeType="mainSeq"/>
@@ -46627,7 +46928,7 @@
 </p:sld>
 </file>
 
-<file path=ppt/slides/slide7.xml><?xml version="1.0" encoding="utf-8"?>
+<file path=ppt/slides/slide8.xml><?xml version="1.0" encoding="utf-8"?>
 <p:sld xmlns:a="http://schemas.openxmlformats.org/drawingml/2006/main" xmlns:r="http://schemas.openxmlformats.org/officeDocument/2006/relationships" xmlns:p="http://schemas.openxmlformats.org/presentationml/2006/main">
   <p:cSld>
     <p:spTree>
@@ -46745,8 +47046,45 @@
                 <a:ea typeface="Droid Sans" charset="0"/>
                 <a:cs typeface="Droid Sans" charset="0"/>
               </a:rPr>
-              <a:t>User accesses application and chooses desired Jag Tran stop. System outputs the amount of time since last departure of a bus and amount of time before another bus arrives. </a:t>
+              <a:t>User accesses application and chooses desired Jag Tran stop. System outputs the amount of time since last departure of a bus and amount of time before another bus arrives</a:t>
             </a:r>
+            <a:r>
+              <a:rPr lang="en-US" sz="2400" dirty="0" smtClean="0">
+                <a:solidFill>
+                  <a:srgbClr val="000000"/>
+                </a:solidFill>
+                <a:ea typeface="Droid Sans" charset="0"/>
+                <a:cs typeface="Droid Sans" charset="0"/>
+              </a:rPr>
+              <a:t>. </a:t>
+            </a:r>
+            <a:r>
+              <a:rPr lang="en-US" sz="2400" dirty="0" smtClean="0">
+                <a:solidFill>
+                  <a:srgbClr val="000000"/>
+                </a:solidFill>
+                <a:ea typeface="Droid Sans" charset="0"/>
+                <a:cs typeface="Droid Sans" charset="0"/>
+              </a:rPr>
+              <a:t>Check bus status</a:t>
+            </a:r>
+            <a:r>
+              <a:rPr lang="en-US" sz="2400" dirty="0" smtClean="0">
+                <a:solidFill>
+                  <a:srgbClr val="000000"/>
+                </a:solidFill>
+                <a:ea typeface="Droid Sans" charset="0"/>
+                <a:cs typeface="Droid Sans" charset="0"/>
+              </a:rPr>
+              <a:t> </a:t>
+            </a:r>
+            <a:endParaRPr lang="en-US" sz="2400" dirty="0">
+              <a:solidFill>
+                <a:srgbClr val="000000"/>
+              </a:solidFill>
+              <a:ea typeface="Droid Sans" charset="0"/>
+              <a:cs typeface="Droid Sans" charset="0"/>
+            </a:endParaRPr>
           </a:p>
           <a:p>
             <a:pPr marL="195843" indent="-195843">
@@ -46804,8 +47142,45 @@
                 <a:ea typeface="Droid Sans" charset="0"/>
                 <a:cs typeface="Droid Sans" charset="0"/>
               </a:rPr>
-              <a:t>Application is accessed and the system tells how many people are on each jag Tran bus. </a:t>
+              <a:t>Application is accessed and the system tells how many people are on each </a:t>
             </a:r>
+            <a:r>
+              <a:rPr lang="en-US" sz="2400" dirty="0" smtClean="0">
+                <a:solidFill>
+                  <a:srgbClr val="000000"/>
+                </a:solidFill>
+                <a:ea typeface="Droid Sans" charset="0"/>
+                <a:cs typeface="Droid Sans" charset="0"/>
+              </a:rPr>
+              <a:t>JagTran </a:t>
+            </a:r>
+            <a:r>
+              <a:rPr lang="en-US" sz="2400" dirty="0">
+                <a:solidFill>
+                  <a:srgbClr val="000000"/>
+                </a:solidFill>
+                <a:ea typeface="Droid Sans" charset="0"/>
+                <a:cs typeface="Droid Sans" charset="0"/>
+              </a:rPr>
+              <a:t>bus. </a:t>
+            </a:r>
+            <a:r>
+              <a:rPr lang="en-US" sz="2400" dirty="0" smtClean="0">
+                <a:solidFill>
+                  <a:srgbClr val="000000"/>
+                </a:solidFill>
+                <a:ea typeface="Droid Sans" charset="0"/>
+                <a:cs typeface="Droid Sans" charset="0"/>
+              </a:rPr>
+              <a:t>Check bus load</a:t>
+            </a:r>
+            <a:endParaRPr lang="en-US" sz="2400" dirty="0">
+              <a:solidFill>
+                <a:srgbClr val="000000"/>
+              </a:solidFill>
+              <a:ea typeface="Droid Sans" charset="0"/>
+              <a:cs typeface="Droid Sans" charset="0"/>
+            </a:endParaRPr>
           </a:p>
         </p:txBody>
       </p:sp>
@@ -46818,7 +47193,7 @@
   <p:timing>
     <p:tnLst>
       <p:par>
-        <p:cTn id="1" dur="indefinite" nodeType="tmRoot">
+        <p:cTn id="1" dur="indefinite" restart="never" nodeType="tmRoot">
           <p:childTnLst>
             <p:seq concurrent="1" nextAc="seek">
               <p:cTn id="2" dur="0" nodeType="mainSeq"/>
@@ -46845,7 +47220,7 @@
 </p:sld>
 </file>
 
-<file path=ppt/slides/slide8.xml><?xml version="1.0" encoding="utf-8"?>
+<file path=ppt/slides/slide9.xml><?xml version="1.0" encoding="utf-8"?>
 <p:sld xmlns:a="http://schemas.openxmlformats.org/drawingml/2006/main" xmlns:r="http://schemas.openxmlformats.org/officeDocument/2006/relationships" xmlns:p="http://schemas.openxmlformats.org/presentationml/2006/main">
   <p:cSld>
     <p:spTree>
@@ -46939,91 +47314,6 @@
           </a:graphicData>
         </a:graphic>
       </p:graphicFrame>
-    </p:spTree>
-  </p:cSld>
-  <p:clrMapOvr>
-    <a:masterClrMapping/>
-  </p:clrMapOvr>
-  <p:transition>
-    <p:fade thruBlk="1"/>
-  </p:transition>
-  <p:timing>
-    <p:tnLst>
-      <p:par>
-        <p:cTn id="1" dur="indefinite" restart="never" nodeType="tmRoot"/>
-      </p:par>
-    </p:tnLst>
-  </p:timing>
-</p:sld>
-</file>
-
-<file path=ppt/slides/slide9.xml><?xml version="1.0" encoding="utf-8"?>
-<p:sld xmlns:a="http://schemas.openxmlformats.org/drawingml/2006/main" xmlns:r="http://schemas.openxmlformats.org/officeDocument/2006/relationships" xmlns:p="http://schemas.openxmlformats.org/presentationml/2006/main">
-  <p:cSld>
-    <p:spTree>
-      <p:nvGrpSpPr>
-        <p:cNvPr id="1" name=""/>
-        <p:cNvGrpSpPr/>
-        <p:nvPr/>
-      </p:nvGrpSpPr>
-      <p:grpSpPr>
-        <a:xfrm>
-          <a:off x="0" y="0"/>
-          <a:ext cx="0" cy="0"/>
-          <a:chOff x="0" y="0"/>
-          <a:chExt cx="0" cy="0"/>
-        </a:xfrm>
-      </p:grpSpPr>
-      <p:graphicFrame>
-        <p:nvGraphicFramePr>
-          <p:cNvPr id="4" name="Content Placeholder 3"/>
-          <p:cNvGraphicFramePr>
-            <a:graphicFrameLocks noGrp="1"/>
-          </p:cNvGraphicFramePr>
-          <p:nvPr>
-            <p:ph idx="1"/>
-          </p:nvPr>
-        </p:nvGraphicFramePr>
-        <p:xfrm>
-          <a:off x="457200" y="1143000"/>
-          <a:ext cx="8153400" cy="5181599"/>
-        </p:xfrm>
-        <a:graphic>
-          <a:graphicData uri="http://schemas.openxmlformats.org/drawingml/2006/diagram">
-            <dgm:relIds xmlns:dgm="http://schemas.openxmlformats.org/drawingml/2006/diagram" xmlns:r="http://schemas.openxmlformats.org/officeDocument/2006/relationships" r:dm="rId2" r:lo="rId3" r:qs="rId4" r:cs="rId5"/>
-          </a:graphicData>
-        </a:graphic>
-      </p:graphicFrame>
-      <p:sp>
-        <p:nvSpPr>
-          <p:cNvPr id="6" name="Title 1"/>
-          <p:cNvSpPr>
-            <a:spLocks noGrp="1"/>
-          </p:cNvSpPr>
-          <p:nvPr>
-            <p:ph type="title"/>
-          </p:nvPr>
-        </p:nvSpPr>
-        <p:spPr>
-          <a:xfrm>
-            <a:off x="457200" y="274638"/>
-            <a:ext cx="8229600" cy="1143000"/>
-          </a:xfrm>
-        </p:spPr>
-        <p:txBody>
-          <a:bodyPr>
-            <a:normAutofit/>
-          </a:bodyPr>
-          <a:lstStyle/>
-          <a:p>
-            <a:r>
-              <a:rPr lang="en-US" altLang="zh-CN" sz="3600" b="1" dirty="0" smtClean="0"/>
-              <a:t>Nonfunctional Requirements</a:t>
-            </a:r>
-            <a:endParaRPr lang="zh-CN" altLang="en-US" sz="3600" b="1" dirty="0"/>
-          </a:p>
-        </p:txBody>
-      </p:sp>
     </p:spTree>
   </p:cSld>
   <p:clrMapOvr>

</xml_diff>